<commit_message>
Updated to include inputs for DSH function.
</commit_message>
<xml_diff>
--- a/Model.pptx
+++ b/Model.pptx
@@ -5,10 +5,12 @@
     <p:sldMasterId id="2147483648" r:id="rId1"/>
   </p:sldMasterIdLst>
   <p:notesMasterIdLst>
-    <p:notesMasterId r:id="rId3"/>
+    <p:notesMasterId r:id="rId5"/>
   </p:notesMasterIdLst>
   <p:sldIdLst>
     <p:sldId id="263" r:id="rId2"/>
+    <p:sldId id="264" r:id="rId3"/>
+    <p:sldId id="265" r:id="rId4"/>
   </p:sldIdLst>
   <p:sldSz cx="12192000" cy="6858000"/>
   <p:notesSz cx="6858000" cy="9144000"/>
@@ -197,7 +199,7 @@
           <a:p>
             <a:fld id="{14D1BE04-9263-435A-81F5-73C17F0C20C1}" type="datetimeFigureOut">
               <a:rPr lang="fr-CH" smtClean="0"/>
-              <a:t>24.11.2021</a:t>
+              <a:t>25.11.2021</a:t>
             </a:fld>
             <a:endParaRPr lang="fr-CH"/>
           </a:p>
@@ -614,7 +616,7 @@
           <a:p>
             <a:fld id="{9E145323-7D54-4AB4-83D4-5EF3B368BC69}" type="datetimeFigureOut">
               <a:rPr lang="fr-CH" smtClean="0"/>
-              <a:t>24.11.2021</a:t>
+              <a:t>25.11.2021</a:t>
             </a:fld>
             <a:endParaRPr lang="fr-CH"/>
           </a:p>
@@ -814,7 +816,7 @@
           <a:p>
             <a:fld id="{9E145323-7D54-4AB4-83D4-5EF3B368BC69}" type="datetimeFigureOut">
               <a:rPr lang="fr-CH" smtClean="0"/>
-              <a:t>24.11.2021</a:t>
+              <a:t>25.11.2021</a:t>
             </a:fld>
             <a:endParaRPr lang="fr-CH"/>
           </a:p>
@@ -1024,7 +1026,7 @@
           <a:p>
             <a:fld id="{9E145323-7D54-4AB4-83D4-5EF3B368BC69}" type="datetimeFigureOut">
               <a:rPr lang="fr-CH" smtClean="0"/>
-              <a:t>24.11.2021</a:t>
+              <a:t>25.11.2021</a:t>
             </a:fld>
             <a:endParaRPr lang="fr-CH"/>
           </a:p>
@@ -1224,7 +1226,7 @@
           <a:p>
             <a:fld id="{9E145323-7D54-4AB4-83D4-5EF3B368BC69}" type="datetimeFigureOut">
               <a:rPr lang="fr-CH" smtClean="0"/>
-              <a:t>24.11.2021</a:t>
+              <a:t>25.11.2021</a:t>
             </a:fld>
             <a:endParaRPr lang="fr-CH"/>
           </a:p>
@@ -1500,7 +1502,7 @@
           <a:p>
             <a:fld id="{9E145323-7D54-4AB4-83D4-5EF3B368BC69}" type="datetimeFigureOut">
               <a:rPr lang="fr-CH" smtClean="0"/>
-              <a:t>24.11.2021</a:t>
+              <a:t>25.11.2021</a:t>
             </a:fld>
             <a:endParaRPr lang="fr-CH"/>
           </a:p>
@@ -1768,7 +1770,7 @@
           <a:p>
             <a:fld id="{9E145323-7D54-4AB4-83D4-5EF3B368BC69}" type="datetimeFigureOut">
               <a:rPr lang="fr-CH" smtClean="0"/>
-              <a:t>24.11.2021</a:t>
+              <a:t>25.11.2021</a:t>
             </a:fld>
             <a:endParaRPr lang="fr-CH"/>
           </a:p>
@@ -2183,7 +2185,7 @@
           <a:p>
             <a:fld id="{9E145323-7D54-4AB4-83D4-5EF3B368BC69}" type="datetimeFigureOut">
               <a:rPr lang="fr-CH" smtClean="0"/>
-              <a:t>24.11.2021</a:t>
+              <a:t>25.11.2021</a:t>
             </a:fld>
             <a:endParaRPr lang="fr-CH"/>
           </a:p>
@@ -2325,7 +2327,7 @@
           <a:p>
             <a:fld id="{9E145323-7D54-4AB4-83D4-5EF3B368BC69}" type="datetimeFigureOut">
               <a:rPr lang="fr-CH" smtClean="0"/>
-              <a:t>24.11.2021</a:t>
+              <a:t>25.11.2021</a:t>
             </a:fld>
             <a:endParaRPr lang="fr-CH"/>
           </a:p>
@@ -2438,7 +2440,7 @@
           <a:p>
             <a:fld id="{9E145323-7D54-4AB4-83D4-5EF3B368BC69}" type="datetimeFigureOut">
               <a:rPr lang="fr-CH" smtClean="0"/>
-              <a:t>24.11.2021</a:t>
+              <a:t>25.11.2021</a:t>
             </a:fld>
             <a:endParaRPr lang="fr-CH"/>
           </a:p>
@@ -2751,7 +2753,7 @@
           <a:p>
             <a:fld id="{9E145323-7D54-4AB4-83D4-5EF3B368BC69}" type="datetimeFigureOut">
               <a:rPr lang="fr-CH" smtClean="0"/>
-              <a:t>24.11.2021</a:t>
+              <a:t>25.11.2021</a:t>
             </a:fld>
             <a:endParaRPr lang="fr-CH"/>
           </a:p>
@@ -3040,7 +3042,7 @@
           <a:p>
             <a:fld id="{9E145323-7D54-4AB4-83D4-5EF3B368BC69}" type="datetimeFigureOut">
               <a:rPr lang="fr-CH" smtClean="0"/>
-              <a:t>24.11.2021</a:t>
+              <a:t>25.11.2021</a:t>
             </a:fld>
             <a:endParaRPr lang="fr-CH"/>
           </a:p>
@@ -3283,7 +3285,7 @@
           <a:p>
             <a:fld id="{9E145323-7D54-4AB4-83D4-5EF3B368BC69}" type="datetimeFigureOut">
               <a:rPr lang="fr-CH" smtClean="0"/>
-              <a:t>24.11.2021</a:t>
+              <a:t>25.11.2021</a:t>
             </a:fld>
             <a:endParaRPr lang="fr-CH"/>
           </a:p>
@@ -8370,8 +8372,8 @@
           </a:p>
         </p:txBody>
       </p:sp>
-      <mc:AlternateContent xmlns:mc="http://schemas.openxmlformats.org/markup-compatibility/2006">
-        <mc:Choice xmlns:a14="http://schemas.microsoft.com/office/drawing/2010/main" Requires="a14">
+      <mc:AlternateContent xmlns:mc="http://schemas.openxmlformats.org/markup-compatibility/2006" xmlns:a14="http://schemas.microsoft.com/office/drawing/2010/main">
+        <mc:Choice Requires="a14">
           <p:sp>
             <p:nvSpPr>
               <p:cNvPr id="31" name="ZoneTexte 30">
@@ -8449,7 +8451,7 @@
             </p:txBody>
           </p:sp>
         </mc:Choice>
-        <mc:Fallback>
+        <mc:Fallback xmlns="">
           <p:sp>
             <p:nvSpPr>
               <p:cNvPr id="31" name="ZoneTexte 30">
@@ -8494,8 +8496,8 @@
           </p:sp>
         </mc:Fallback>
       </mc:AlternateContent>
-      <mc:AlternateContent xmlns:mc="http://schemas.openxmlformats.org/markup-compatibility/2006">
-        <mc:Choice xmlns:a14="http://schemas.microsoft.com/office/drawing/2010/main" Requires="a14">
+      <mc:AlternateContent xmlns:mc="http://schemas.openxmlformats.org/markup-compatibility/2006" xmlns:a14="http://schemas.microsoft.com/office/drawing/2010/main">
+        <mc:Choice Requires="a14">
           <p:sp>
             <p:nvSpPr>
               <p:cNvPr id="388" name="ZoneTexte 387">
@@ -8573,7 +8575,7 @@
             </p:txBody>
           </p:sp>
         </mc:Choice>
-        <mc:Fallback>
+        <mc:Fallback xmlns="">
           <p:sp>
             <p:nvSpPr>
               <p:cNvPr id="388" name="ZoneTexte 387">
@@ -23691,8 +23693,8 @@
           </a:p>
         </p:txBody>
       </p:sp>
-      <mc:AlternateContent xmlns:mc="http://schemas.openxmlformats.org/markup-compatibility/2006">
-        <mc:Choice xmlns:a14="http://schemas.microsoft.com/office/drawing/2010/main" Requires="a14">
+      <mc:AlternateContent xmlns:mc="http://schemas.openxmlformats.org/markup-compatibility/2006" xmlns:a14="http://schemas.microsoft.com/office/drawing/2010/main">
+        <mc:Choice Requires="a14">
           <p:sp>
             <p:nvSpPr>
               <p:cNvPr id="843" name="ZoneTexte 842">
@@ -23770,7 +23772,7 @@
             </p:txBody>
           </p:sp>
         </mc:Choice>
-        <mc:Fallback>
+        <mc:Fallback xmlns="">
           <p:sp>
             <p:nvSpPr>
               <p:cNvPr id="843" name="ZoneTexte 842">
@@ -23815,8 +23817,8 @@
           </p:sp>
         </mc:Fallback>
       </mc:AlternateContent>
-      <mc:AlternateContent xmlns:mc="http://schemas.openxmlformats.org/markup-compatibility/2006">
-        <mc:Choice xmlns:a14="http://schemas.microsoft.com/office/drawing/2010/main" Requires="a14">
+      <mc:AlternateContent xmlns:mc="http://schemas.openxmlformats.org/markup-compatibility/2006" xmlns:a14="http://schemas.microsoft.com/office/drawing/2010/main">
+        <mc:Choice Requires="a14">
           <p:sp>
             <p:nvSpPr>
               <p:cNvPr id="844" name="ZoneTexte 843">
@@ -23894,7 +23896,7 @@
             </p:txBody>
           </p:sp>
         </mc:Choice>
-        <mc:Fallback>
+        <mc:Fallback xmlns="">
           <p:sp>
             <p:nvSpPr>
               <p:cNvPr id="844" name="ZoneTexte 843">
@@ -24819,8 +24821,8 @@
           </a:fontRef>
         </p:style>
       </p:cxnSp>
-      <mc:AlternateContent xmlns:mc="http://schemas.openxmlformats.org/markup-compatibility/2006">
-        <mc:Choice xmlns:a14="http://schemas.microsoft.com/office/drawing/2010/main" Requires="a14">
+      <mc:AlternateContent xmlns:mc="http://schemas.openxmlformats.org/markup-compatibility/2006" xmlns:a14="http://schemas.microsoft.com/office/drawing/2010/main">
+        <mc:Choice Requires="a14">
           <p:sp>
             <p:nvSpPr>
               <p:cNvPr id="574" name="ZoneTexte 573">
@@ -24898,7 +24900,7 @@
             </p:txBody>
           </p:sp>
         </mc:Choice>
-        <mc:Fallback>
+        <mc:Fallback xmlns="">
           <p:sp>
             <p:nvSpPr>
               <p:cNvPr id="574" name="ZoneTexte 573">
@@ -24943,8 +24945,8 @@
           </p:sp>
         </mc:Fallback>
       </mc:AlternateContent>
-      <mc:AlternateContent xmlns:mc="http://schemas.openxmlformats.org/markup-compatibility/2006">
-        <mc:Choice xmlns:a14="http://schemas.microsoft.com/office/drawing/2010/main" Requires="a14">
+      <mc:AlternateContent xmlns:mc="http://schemas.openxmlformats.org/markup-compatibility/2006" xmlns:a14="http://schemas.microsoft.com/office/drawing/2010/main">
+        <mc:Choice Requires="a14">
           <p:sp>
             <p:nvSpPr>
               <p:cNvPr id="758" name="ZoneTexte 757">
@@ -25022,7 +25024,7 @@
             </p:txBody>
           </p:sp>
         </mc:Choice>
-        <mc:Fallback>
+        <mc:Fallback xmlns="">
           <p:sp>
             <p:nvSpPr>
               <p:cNvPr id="758" name="ZoneTexte 757">
@@ -31440,8 +31442,8 @@
           </a:p>
         </p:txBody>
       </p:sp>
-      <mc:AlternateContent xmlns:mc="http://schemas.openxmlformats.org/markup-compatibility/2006">
-        <mc:Choice xmlns:a14="http://schemas.microsoft.com/office/drawing/2010/main" Requires="a14">
+      <mc:AlternateContent xmlns:mc="http://schemas.openxmlformats.org/markup-compatibility/2006" xmlns:a14="http://schemas.microsoft.com/office/drawing/2010/main">
+        <mc:Choice Requires="a14">
           <p:sp>
             <p:nvSpPr>
               <p:cNvPr id="697" name="ZoneTexte 30">
@@ -31519,7 +31521,7 @@
             </p:txBody>
           </p:sp>
         </mc:Choice>
-        <mc:Fallback>
+        <mc:Fallback xmlns="">
           <p:sp>
             <p:nvSpPr>
               <p:cNvPr id="697" name="ZoneTexte 30">
@@ -31564,8 +31566,8 @@
           </p:sp>
         </mc:Fallback>
       </mc:AlternateContent>
-      <mc:AlternateContent xmlns:mc="http://schemas.openxmlformats.org/markup-compatibility/2006">
-        <mc:Choice xmlns:a14="http://schemas.microsoft.com/office/drawing/2010/main" Requires="a14">
+      <mc:AlternateContent xmlns:mc="http://schemas.openxmlformats.org/markup-compatibility/2006" xmlns:a14="http://schemas.microsoft.com/office/drawing/2010/main">
+        <mc:Choice Requires="a14">
           <p:sp>
             <p:nvSpPr>
               <p:cNvPr id="698" name="ZoneTexte 387">
@@ -31643,7 +31645,7 @@
             </p:txBody>
           </p:sp>
         </mc:Choice>
-        <mc:Fallback>
+        <mc:Fallback xmlns="">
           <p:sp>
             <p:nvSpPr>
               <p:cNvPr id="698" name="ZoneTexte 387">
@@ -35604,6 +35606,913 @@
 </p:sld>
 </file>
 
+<file path=ppt/slides/slide2.xml><?xml version="1.0" encoding="utf-8"?>
+<p:sld xmlns:a="http://schemas.openxmlformats.org/drawingml/2006/main" xmlns:r="http://schemas.openxmlformats.org/officeDocument/2006/relationships" xmlns:p="http://schemas.openxmlformats.org/presentationml/2006/main">
+  <p:cSld>
+    <p:spTree>
+      <p:nvGrpSpPr>
+        <p:cNvPr id="1" name=""/>
+        <p:cNvGrpSpPr/>
+        <p:nvPr/>
+      </p:nvGrpSpPr>
+      <p:grpSpPr>
+        <a:xfrm>
+          <a:off x="0" y="0"/>
+          <a:ext cx="0" cy="0"/>
+          <a:chOff x="0" y="0"/>
+          <a:chExt cx="0" cy="0"/>
+        </a:xfrm>
+      </p:grpSpPr>
+      <p:pic>
+        <p:nvPicPr>
+          <p:cNvPr id="22" name="Picture 21">
+            <a:extLst>
+              <a:ext uri="{FF2B5EF4-FFF2-40B4-BE49-F238E27FC236}">
+                <a16:creationId xmlns:a16="http://schemas.microsoft.com/office/drawing/2014/main" id="{9D23E6F0-9C86-46E8-9F87-062930F276D4}"/>
+              </a:ext>
+            </a:extLst>
+          </p:cNvPr>
+          <p:cNvPicPr>
+            <a:picLocks noChangeAspect="1"/>
+          </p:cNvPicPr>
+          <p:nvPr/>
+        </p:nvPicPr>
+        <p:blipFill>
+          <a:blip r:embed="rId2"/>
+          <a:stretch>
+            <a:fillRect/>
+          </a:stretch>
+        </p:blipFill>
+        <p:spPr>
+          <a:xfrm>
+            <a:off x="269236" y="1398707"/>
+            <a:ext cx="11646440" cy="4060586"/>
+          </a:xfrm>
+          <a:prstGeom prst="rect">
+            <a:avLst/>
+          </a:prstGeom>
+        </p:spPr>
+      </p:pic>
+      <p:pic>
+        <p:nvPicPr>
+          <p:cNvPr id="5" name="Picture 4">
+            <a:extLst>
+              <a:ext uri="{FF2B5EF4-FFF2-40B4-BE49-F238E27FC236}">
+                <a16:creationId xmlns:a16="http://schemas.microsoft.com/office/drawing/2014/main" id="{E6F1435C-4F0F-4B92-9424-80AD1D3E16CD}"/>
+              </a:ext>
+            </a:extLst>
+          </p:cNvPr>
+          <p:cNvPicPr>
+            <a:picLocks noChangeAspect="1"/>
+          </p:cNvPicPr>
+          <p:nvPr/>
+        </p:nvPicPr>
+        <p:blipFill>
+          <a:blip r:embed="rId2"/>
+          <a:stretch>
+            <a:fillRect/>
+          </a:stretch>
+        </p:blipFill>
+        <p:spPr>
+          <a:xfrm>
+            <a:off x="272780" y="1398707"/>
+            <a:ext cx="11646440" cy="4060586"/>
+          </a:xfrm>
+          <a:prstGeom prst="rect">
+            <a:avLst/>
+          </a:prstGeom>
+        </p:spPr>
+      </p:pic>
+      <p:cxnSp>
+        <p:nvCxnSpPr>
+          <p:cNvPr id="7" name="Straight Arrow Connector 6">
+            <a:extLst>
+              <a:ext uri="{FF2B5EF4-FFF2-40B4-BE49-F238E27FC236}">
+                <a16:creationId xmlns:a16="http://schemas.microsoft.com/office/drawing/2014/main" id="{78FDFBF8-6282-42B8-A41F-52338E4AD773}"/>
+              </a:ext>
+            </a:extLst>
+          </p:cNvPr>
+          <p:cNvCxnSpPr/>
+          <p:nvPr/>
+        </p:nvCxnSpPr>
+        <p:spPr>
+          <a:xfrm>
+            <a:off x="499730" y="5337544"/>
+            <a:ext cx="5114261" cy="0"/>
+          </a:xfrm>
+          <a:prstGeom prst="straightConnector1">
+            <a:avLst/>
+          </a:prstGeom>
+          <a:ln>
+            <a:headEnd type="triangle"/>
+            <a:tailEnd type="triangle"/>
+          </a:ln>
+        </p:spPr>
+        <p:style>
+          <a:lnRef idx="1">
+            <a:schemeClr val="accent1"/>
+          </a:lnRef>
+          <a:fillRef idx="0">
+            <a:schemeClr val="accent1"/>
+          </a:fillRef>
+          <a:effectRef idx="0">
+            <a:schemeClr val="accent1"/>
+          </a:effectRef>
+          <a:fontRef idx="minor">
+            <a:schemeClr val="tx1"/>
+          </a:fontRef>
+        </p:style>
+      </p:cxnSp>
+      <p:cxnSp>
+        <p:nvCxnSpPr>
+          <p:cNvPr id="9" name="Straight Arrow Connector 8">
+            <a:extLst>
+              <a:ext uri="{FF2B5EF4-FFF2-40B4-BE49-F238E27FC236}">
+                <a16:creationId xmlns:a16="http://schemas.microsoft.com/office/drawing/2014/main" id="{AD966112-45CD-4BC5-A05C-210FC5A101C1}"/>
+              </a:ext>
+            </a:extLst>
+          </p:cNvPr>
+          <p:cNvCxnSpPr>
+            <a:cxnSpLocks/>
+          </p:cNvCxnSpPr>
+          <p:nvPr/>
+        </p:nvCxnSpPr>
+        <p:spPr>
+          <a:xfrm flipV="1">
+            <a:off x="6096000" y="2796363"/>
+            <a:ext cx="0" cy="1658680"/>
+          </a:xfrm>
+          <a:prstGeom prst="straightConnector1">
+            <a:avLst/>
+          </a:prstGeom>
+          <a:ln>
+            <a:headEnd type="triangle"/>
+            <a:tailEnd type="triangle"/>
+          </a:ln>
+        </p:spPr>
+        <p:style>
+          <a:lnRef idx="1">
+            <a:schemeClr val="accent1"/>
+          </a:lnRef>
+          <a:fillRef idx="0">
+            <a:schemeClr val="accent1"/>
+          </a:fillRef>
+          <a:effectRef idx="0">
+            <a:schemeClr val="accent1"/>
+          </a:effectRef>
+          <a:fontRef idx="minor">
+            <a:schemeClr val="tx1"/>
+          </a:fontRef>
+        </p:style>
+      </p:cxnSp>
+      <p:cxnSp>
+        <p:nvCxnSpPr>
+          <p:cNvPr id="11" name="Straight Arrow Connector 10">
+            <a:extLst>
+              <a:ext uri="{FF2B5EF4-FFF2-40B4-BE49-F238E27FC236}">
+                <a16:creationId xmlns:a16="http://schemas.microsoft.com/office/drawing/2014/main" id="{3F514C38-20CC-4651-96A1-CD8D63511CAE}"/>
+              </a:ext>
+            </a:extLst>
+          </p:cNvPr>
+          <p:cNvCxnSpPr>
+            <a:cxnSpLocks/>
+          </p:cNvCxnSpPr>
+          <p:nvPr/>
+        </p:nvCxnSpPr>
+        <p:spPr>
+          <a:xfrm>
+            <a:off x="8708066" y="5202865"/>
+            <a:ext cx="2466753" cy="0"/>
+          </a:xfrm>
+          <a:prstGeom prst="straightConnector1">
+            <a:avLst/>
+          </a:prstGeom>
+          <a:ln>
+            <a:headEnd type="triangle"/>
+            <a:tailEnd type="triangle"/>
+          </a:ln>
+        </p:spPr>
+        <p:style>
+          <a:lnRef idx="1">
+            <a:schemeClr val="accent1"/>
+          </a:lnRef>
+          <a:fillRef idx="0">
+            <a:schemeClr val="accent1"/>
+          </a:fillRef>
+          <a:effectRef idx="0">
+            <a:schemeClr val="accent1"/>
+          </a:effectRef>
+          <a:fontRef idx="minor">
+            <a:schemeClr val="tx1"/>
+          </a:fontRef>
+        </p:style>
+      </p:cxnSp>
+      <p:sp>
+        <p:nvSpPr>
+          <p:cNvPr id="13" name="TextBox 12">
+            <a:extLst>
+              <a:ext uri="{FF2B5EF4-FFF2-40B4-BE49-F238E27FC236}">
+                <a16:creationId xmlns:a16="http://schemas.microsoft.com/office/drawing/2014/main" id="{56953D0E-75CE-4023-B629-51E6BEF64D43}"/>
+              </a:ext>
+            </a:extLst>
+          </p:cNvPr>
+          <p:cNvSpPr txBox="1"/>
+          <p:nvPr/>
+        </p:nvSpPr>
+        <p:spPr>
+          <a:xfrm>
+            <a:off x="2743202" y="5335501"/>
+            <a:ext cx="1116414" cy="369332"/>
+          </a:xfrm>
+          <a:prstGeom prst="rect">
+            <a:avLst/>
+          </a:prstGeom>
+          <a:noFill/>
+        </p:spPr>
+        <p:txBody>
+          <a:bodyPr wrap="square" rtlCol="0">
+            <a:spAutoFit/>
+          </a:bodyPr>
+          <a:lstStyle/>
+          <a:p>
+            <a:r>
+              <a:rPr lang="en-US" dirty="0"/>
+              <a:t>14.5 m</a:t>
+            </a:r>
+            <a:endParaRPr lang="en-GB" dirty="0"/>
+          </a:p>
+        </p:txBody>
+      </p:sp>
+      <p:sp>
+        <p:nvSpPr>
+          <p:cNvPr id="14" name="TextBox 13">
+            <a:extLst>
+              <a:ext uri="{FF2B5EF4-FFF2-40B4-BE49-F238E27FC236}">
+                <a16:creationId xmlns:a16="http://schemas.microsoft.com/office/drawing/2014/main" id="{946B6E80-4D8E-4D70-90DA-B357340A4630}"/>
+              </a:ext>
+            </a:extLst>
+          </p:cNvPr>
+          <p:cNvSpPr txBox="1"/>
+          <p:nvPr/>
+        </p:nvSpPr>
+        <p:spPr>
+          <a:xfrm>
+            <a:off x="6244853" y="3256371"/>
+            <a:ext cx="1116414" cy="369332"/>
+          </a:xfrm>
+          <a:prstGeom prst="rect">
+            <a:avLst/>
+          </a:prstGeom>
+          <a:noFill/>
+        </p:spPr>
+        <p:txBody>
+          <a:bodyPr wrap="square" rtlCol="0">
+            <a:spAutoFit/>
+          </a:bodyPr>
+          <a:lstStyle/>
+          <a:p>
+            <a:r>
+              <a:rPr lang="en-US" dirty="0"/>
+              <a:t>5 m</a:t>
+            </a:r>
+            <a:endParaRPr lang="en-GB" dirty="0"/>
+          </a:p>
+        </p:txBody>
+      </p:sp>
+      <p:sp>
+        <p:nvSpPr>
+          <p:cNvPr id="15" name="TextBox 14">
+            <a:extLst>
+              <a:ext uri="{FF2B5EF4-FFF2-40B4-BE49-F238E27FC236}">
+                <a16:creationId xmlns:a16="http://schemas.microsoft.com/office/drawing/2014/main" id="{0A733C82-E59F-48BB-821F-38B87114F630}"/>
+              </a:ext>
+            </a:extLst>
+          </p:cNvPr>
+          <p:cNvSpPr txBox="1"/>
+          <p:nvPr/>
+        </p:nvSpPr>
+        <p:spPr>
+          <a:xfrm>
+            <a:off x="9672081" y="5274627"/>
+            <a:ext cx="1116414" cy="369332"/>
+          </a:xfrm>
+          <a:prstGeom prst="rect">
+            <a:avLst/>
+          </a:prstGeom>
+          <a:noFill/>
+        </p:spPr>
+        <p:txBody>
+          <a:bodyPr wrap="square" rtlCol="0">
+            <a:spAutoFit/>
+          </a:bodyPr>
+          <a:lstStyle/>
+          <a:p>
+            <a:r>
+              <a:rPr lang="en-US" dirty="0"/>
+              <a:t>7 m</a:t>
+            </a:r>
+            <a:endParaRPr lang="en-GB" dirty="0"/>
+          </a:p>
+        </p:txBody>
+      </p:sp>
+      <p:cxnSp>
+        <p:nvCxnSpPr>
+          <p:cNvPr id="17" name="Straight Arrow Connector 16">
+            <a:extLst>
+              <a:ext uri="{FF2B5EF4-FFF2-40B4-BE49-F238E27FC236}">
+                <a16:creationId xmlns:a16="http://schemas.microsoft.com/office/drawing/2014/main" id="{4E1629F5-6632-4FEE-B69E-9821A6FDB5F7}"/>
+              </a:ext>
+            </a:extLst>
+          </p:cNvPr>
+          <p:cNvCxnSpPr>
+            <a:cxnSpLocks/>
+          </p:cNvCxnSpPr>
+          <p:nvPr/>
+        </p:nvCxnSpPr>
+        <p:spPr>
+          <a:xfrm flipV="1">
+            <a:off x="6092456" y="1807535"/>
+            <a:ext cx="0" cy="988828"/>
+          </a:xfrm>
+          <a:prstGeom prst="straightConnector1">
+            <a:avLst/>
+          </a:prstGeom>
+          <a:ln>
+            <a:headEnd type="triangle"/>
+            <a:tailEnd type="triangle"/>
+          </a:ln>
+        </p:spPr>
+        <p:style>
+          <a:lnRef idx="1">
+            <a:schemeClr val="accent1"/>
+          </a:lnRef>
+          <a:fillRef idx="0">
+            <a:schemeClr val="accent1"/>
+          </a:fillRef>
+          <a:effectRef idx="0">
+            <a:schemeClr val="accent1"/>
+          </a:effectRef>
+          <a:fontRef idx="minor">
+            <a:schemeClr val="tx1"/>
+          </a:fontRef>
+        </p:style>
+      </p:cxnSp>
+      <p:sp>
+        <p:nvSpPr>
+          <p:cNvPr id="19" name="TextBox 18">
+            <a:extLst>
+              <a:ext uri="{FF2B5EF4-FFF2-40B4-BE49-F238E27FC236}">
+                <a16:creationId xmlns:a16="http://schemas.microsoft.com/office/drawing/2014/main" id="{E5B42095-A782-4D20-A5B3-52ED1368C4C7}"/>
+              </a:ext>
+            </a:extLst>
+          </p:cNvPr>
+          <p:cNvSpPr txBox="1"/>
+          <p:nvPr/>
+        </p:nvSpPr>
+        <p:spPr>
+          <a:xfrm>
+            <a:off x="6274973" y="2117283"/>
+            <a:ext cx="1116414" cy="369332"/>
+          </a:xfrm>
+          <a:prstGeom prst="rect">
+            <a:avLst/>
+          </a:prstGeom>
+          <a:noFill/>
+        </p:spPr>
+        <p:txBody>
+          <a:bodyPr wrap="square" rtlCol="0">
+            <a:spAutoFit/>
+          </a:bodyPr>
+          <a:lstStyle/>
+          <a:p>
+            <a:r>
+              <a:rPr lang="en-US" dirty="0"/>
+              <a:t>2 m</a:t>
+            </a:r>
+            <a:endParaRPr lang="en-GB" dirty="0"/>
+          </a:p>
+        </p:txBody>
+      </p:sp>
+    </p:spTree>
+    <p:extLst>
+      <p:ext uri="{BB962C8B-B14F-4D97-AF65-F5344CB8AC3E}">
+        <p14:creationId xmlns:p14="http://schemas.microsoft.com/office/powerpoint/2010/main" val="2216805819"/>
+      </p:ext>
+    </p:extLst>
+  </p:cSld>
+  <p:clrMapOvr>
+    <a:masterClrMapping/>
+  </p:clrMapOvr>
+</p:sld>
+</file>
+
+<file path=ppt/slides/slide3.xml><?xml version="1.0" encoding="utf-8"?>
+<p:sld xmlns:a="http://schemas.openxmlformats.org/drawingml/2006/main" xmlns:r="http://schemas.openxmlformats.org/officeDocument/2006/relationships" xmlns:p="http://schemas.openxmlformats.org/presentationml/2006/main">
+  <p:cSld>
+    <p:spTree>
+      <p:nvGrpSpPr>
+        <p:cNvPr id="1" name=""/>
+        <p:cNvGrpSpPr/>
+        <p:nvPr/>
+      </p:nvGrpSpPr>
+      <p:grpSpPr>
+        <a:xfrm>
+          <a:off x="0" y="0"/>
+          <a:ext cx="0" cy="0"/>
+          <a:chOff x="0" y="0"/>
+          <a:chExt cx="0" cy="0"/>
+        </a:xfrm>
+      </p:grpSpPr>
+      <p:pic>
+        <p:nvPicPr>
+          <p:cNvPr id="5" name="Picture 4">
+            <a:extLst>
+              <a:ext uri="{FF2B5EF4-FFF2-40B4-BE49-F238E27FC236}">
+                <a16:creationId xmlns:a16="http://schemas.microsoft.com/office/drawing/2014/main" id="{2E013748-E050-4C6A-80FD-7EFC3D2867DB}"/>
+              </a:ext>
+            </a:extLst>
+          </p:cNvPr>
+          <p:cNvPicPr>
+            <a:picLocks noChangeAspect="1"/>
+          </p:cNvPicPr>
+          <p:nvPr/>
+        </p:nvPicPr>
+        <p:blipFill rotWithShape="1">
+          <a:blip r:embed="rId2"/>
+          <a:srcRect l="30804" t="29060"/>
+          <a:stretch/>
+        </p:blipFill>
+        <p:spPr>
+          <a:xfrm>
+            <a:off x="3839017" y="1913859"/>
+            <a:ext cx="5804049" cy="4540103"/>
+          </a:xfrm>
+          <a:prstGeom prst="rect">
+            <a:avLst/>
+          </a:prstGeom>
+        </p:spPr>
+      </p:pic>
+      <p:sp>
+        <p:nvSpPr>
+          <p:cNvPr id="6" name="Oval 5">
+            <a:extLst>
+              <a:ext uri="{FF2B5EF4-FFF2-40B4-BE49-F238E27FC236}">
+                <a16:creationId xmlns:a16="http://schemas.microsoft.com/office/drawing/2014/main" id="{6DFBDCD4-91DC-4BFB-BD6B-4804C968D7FA}"/>
+              </a:ext>
+            </a:extLst>
+          </p:cNvPr>
+          <p:cNvSpPr/>
+          <p:nvPr/>
+        </p:nvSpPr>
+        <p:spPr>
+          <a:xfrm>
+            <a:off x="3519377" y="1382233"/>
+            <a:ext cx="3221665" cy="2908004"/>
+          </a:xfrm>
+          <a:prstGeom prst="ellipse">
+            <a:avLst/>
+          </a:prstGeom>
+          <a:noFill/>
+          <a:ln w="28575">
+            <a:solidFill>
+              <a:srgbClr val="FF0000"/>
+            </a:solidFill>
+          </a:ln>
+        </p:spPr>
+        <p:style>
+          <a:lnRef idx="2">
+            <a:schemeClr val="accent1">
+              <a:shade val="50000"/>
+            </a:schemeClr>
+          </a:lnRef>
+          <a:fillRef idx="1">
+            <a:schemeClr val="accent1"/>
+          </a:fillRef>
+          <a:effectRef idx="0">
+            <a:schemeClr val="accent1"/>
+          </a:effectRef>
+          <a:fontRef idx="minor">
+            <a:schemeClr val="lt1"/>
+          </a:fontRef>
+        </p:style>
+        <p:txBody>
+          <a:bodyPr rtlCol="0" anchor="ctr"/>
+          <a:lstStyle/>
+          <a:p>
+            <a:pPr algn="ctr"/>
+            <a:endParaRPr lang="en-GB"/>
+          </a:p>
+        </p:txBody>
+      </p:sp>
+      <p:sp>
+        <p:nvSpPr>
+          <p:cNvPr id="7" name="TextBox 6">
+            <a:extLst>
+              <a:ext uri="{FF2B5EF4-FFF2-40B4-BE49-F238E27FC236}">
+                <a16:creationId xmlns:a16="http://schemas.microsoft.com/office/drawing/2014/main" id="{BA3A11A6-74F1-4455-91A5-6470F7EE06C6}"/>
+              </a:ext>
+            </a:extLst>
+          </p:cNvPr>
+          <p:cNvSpPr txBox="1"/>
+          <p:nvPr/>
+        </p:nvSpPr>
+        <p:spPr>
+          <a:xfrm>
+            <a:off x="4345169" y="2193116"/>
+            <a:ext cx="1116414" cy="369332"/>
+          </a:xfrm>
+          <a:prstGeom prst="rect">
+            <a:avLst/>
+          </a:prstGeom>
+          <a:noFill/>
+        </p:spPr>
+        <p:txBody>
+          <a:bodyPr wrap="square" rtlCol="0">
+            <a:spAutoFit/>
+          </a:bodyPr>
+          <a:lstStyle/>
+          <a:p>
+            <a:r>
+              <a:rPr lang="en-US" dirty="0"/>
+              <a:t>W1</a:t>
+            </a:r>
+            <a:endParaRPr lang="en-GB" dirty="0"/>
+          </a:p>
+        </p:txBody>
+      </p:sp>
+      <p:sp>
+        <p:nvSpPr>
+          <p:cNvPr id="8" name="TextBox 7">
+            <a:extLst>
+              <a:ext uri="{FF2B5EF4-FFF2-40B4-BE49-F238E27FC236}">
+                <a16:creationId xmlns:a16="http://schemas.microsoft.com/office/drawing/2014/main" id="{EAC62947-7183-413A-A9B5-4BAC692F3755}"/>
+              </a:ext>
+            </a:extLst>
+          </p:cNvPr>
+          <p:cNvSpPr txBox="1"/>
+          <p:nvPr/>
+        </p:nvSpPr>
+        <p:spPr>
+          <a:xfrm>
+            <a:off x="4903376" y="2651569"/>
+            <a:ext cx="1116414" cy="369332"/>
+          </a:xfrm>
+          <a:prstGeom prst="rect">
+            <a:avLst/>
+          </a:prstGeom>
+          <a:noFill/>
+        </p:spPr>
+        <p:txBody>
+          <a:bodyPr wrap="square" rtlCol="0">
+            <a:spAutoFit/>
+          </a:bodyPr>
+          <a:lstStyle/>
+          <a:p>
+            <a:r>
+              <a:rPr lang="en-US" dirty="0"/>
+              <a:t>R1</a:t>
+            </a:r>
+            <a:endParaRPr lang="en-GB" dirty="0"/>
+          </a:p>
+        </p:txBody>
+      </p:sp>
+      <p:sp>
+        <p:nvSpPr>
+          <p:cNvPr id="9" name="TextBox 8">
+            <a:extLst>
+              <a:ext uri="{FF2B5EF4-FFF2-40B4-BE49-F238E27FC236}">
+                <a16:creationId xmlns:a16="http://schemas.microsoft.com/office/drawing/2014/main" id="{910B6194-6E62-4470-859A-3B16F08C7138}"/>
+              </a:ext>
+            </a:extLst>
+          </p:cNvPr>
+          <p:cNvSpPr txBox="1"/>
+          <p:nvPr/>
+        </p:nvSpPr>
+        <p:spPr>
+          <a:xfrm>
+            <a:off x="5130209" y="3090312"/>
+            <a:ext cx="1116414" cy="369332"/>
+          </a:xfrm>
+          <a:prstGeom prst="rect">
+            <a:avLst/>
+          </a:prstGeom>
+          <a:noFill/>
+        </p:spPr>
+        <p:txBody>
+          <a:bodyPr wrap="square" rtlCol="0">
+            <a:spAutoFit/>
+          </a:bodyPr>
+          <a:lstStyle/>
+          <a:p>
+            <a:r>
+              <a:rPr lang="en-US" dirty="0"/>
+              <a:t>R2</a:t>
+            </a:r>
+            <a:endParaRPr lang="en-GB" dirty="0"/>
+          </a:p>
+        </p:txBody>
+      </p:sp>
+      <p:sp>
+        <p:nvSpPr>
+          <p:cNvPr id="10" name="TextBox 9">
+            <a:extLst>
+              <a:ext uri="{FF2B5EF4-FFF2-40B4-BE49-F238E27FC236}">
+                <a16:creationId xmlns:a16="http://schemas.microsoft.com/office/drawing/2014/main" id="{7B1656F8-AC5E-4C98-AF4D-19137FA616C4}"/>
+              </a:ext>
+            </a:extLst>
+          </p:cNvPr>
+          <p:cNvSpPr txBox="1"/>
+          <p:nvPr/>
+        </p:nvSpPr>
+        <p:spPr>
+          <a:xfrm>
+            <a:off x="5781223" y="1890387"/>
+            <a:ext cx="1116414" cy="369332"/>
+          </a:xfrm>
+          <a:prstGeom prst="rect">
+            <a:avLst/>
+          </a:prstGeom>
+          <a:noFill/>
+        </p:spPr>
+        <p:txBody>
+          <a:bodyPr wrap="square" rtlCol="0">
+            <a:spAutoFit/>
+          </a:bodyPr>
+          <a:lstStyle/>
+          <a:p>
+            <a:r>
+              <a:rPr lang="en-US" dirty="0"/>
+              <a:t>W2</a:t>
+            </a:r>
+            <a:endParaRPr lang="en-GB" dirty="0"/>
+          </a:p>
+        </p:txBody>
+      </p:sp>
+      <p:sp>
+        <p:nvSpPr>
+          <p:cNvPr id="11" name="TextBox 10">
+            <a:extLst>
+              <a:ext uri="{FF2B5EF4-FFF2-40B4-BE49-F238E27FC236}">
+                <a16:creationId xmlns:a16="http://schemas.microsoft.com/office/drawing/2014/main" id="{D953E17D-E114-4F98-9B4F-43FAA98F3448}"/>
+              </a:ext>
+            </a:extLst>
+          </p:cNvPr>
+          <p:cNvSpPr txBox="1"/>
+          <p:nvPr/>
+        </p:nvSpPr>
+        <p:spPr>
+          <a:xfrm>
+            <a:off x="5624627" y="3317031"/>
+            <a:ext cx="1116414" cy="369332"/>
+          </a:xfrm>
+          <a:prstGeom prst="rect">
+            <a:avLst/>
+          </a:prstGeom>
+          <a:noFill/>
+        </p:spPr>
+        <p:txBody>
+          <a:bodyPr wrap="square" rtlCol="0">
+            <a:spAutoFit/>
+          </a:bodyPr>
+          <a:lstStyle/>
+          <a:p>
+            <a:r>
+              <a:rPr lang="en-US" dirty="0"/>
+              <a:t>W3</a:t>
+            </a:r>
+            <a:endParaRPr lang="en-GB" dirty="0"/>
+          </a:p>
+        </p:txBody>
+      </p:sp>
+      <p:sp>
+        <p:nvSpPr>
+          <p:cNvPr id="12" name="TextBox 11">
+            <a:extLst>
+              <a:ext uri="{FF2B5EF4-FFF2-40B4-BE49-F238E27FC236}">
+                <a16:creationId xmlns:a16="http://schemas.microsoft.com/office/drawing/2014/main" id="{712E826E-D35A-4DA9-8512-1CB5D3756D77}"/>
+              </a:ext>
+            </a:extLst>
+          </p:cNvPr>
+          <p:cNvSpPr txBox="1"/>
+          <p:nvPr/>
+        </p:nvSpPr>
+        <p:spPr>
+          <a:xfrm>
+            <a:off x="4013795" y="3686363"/>
+            <a:ext cx="1116414" cy="369332"/>
+          </a:xfrm>
+          <a:prstGeom prst="rect">
+            <a:avLst/>
+          </a:prstGeom>
+          <a:noFill/>
+        </p:spPr>
+        <p:txBody>
+          <a:bodyPr wrap="square" rtlCol="0">
+            <a:spAutoFit/>
+          </a:bodyPr>
+          <a:lstStyle/>
+          <a:p>
+            <a:r>
+              <a:rPr lang="en-US" dirty="0"/>
+              <a:t>W4</a:t>
+            </a:r>
+            <a:endParaRPr lang="en-GB" dirty="0"/>
+          </a:p>
+        </p:txBody>
+      </p:sp>
+      <p:sp>
+        <p:nvSpPr>
+          <p:cNvPr id="13" name="TextBox 12">
+            <a:extLst>
+              <a:ext uri="{FF2B5EF4-FFF2-40B4-BE49-F238E27FC236}">
+                <a16:creationId xmlns:a16="http://schemas.microsoft.com/office/drawing/2014/main" id="{4782FB1B-A7CC-402B-9942-B6C27DC62E7B}"/>
+              </a:ext>
+            </a:extLst>
+          </p:cNvPr>
+          <p:cNvSpPr txBox="1"/>
+          <p:nvPr/>
+        </p:nvSpPr>
+        <p:spPr>
+          <a:xfrm>
+            <a:off x="5304987" y="3573945"/>
+            <a:ext cx="1116414" cy="369332"/>
+          </a:xfrm>
+          <a:prstGeom prst="rect">
+            <a:avLst/>
+          </a:prstGeom>
+          <a:noFill/>
+        </p:spPr>
+        <p:txBody>
+          <a:bodyPr wrap="square" rtlCol="0">
+            <a:spAutoFit/>
+          </a:bodyPr>
+          <a:lstStyle/>
+          <a:p>
+            <a:r>
+              <a:rPr lang="en-US" dirty="0"/>
+              <a:t>G1</a:t>
+            </a:r>
+            <a:endParaRPr lang="en-GB" dirty="0"/>
+          </a:p>
+        </p:txBody>
+      </p:sp>
+      <p:sp>
+        <p:nvSpPr>
+          <p:cNvPr id="14" name="TextBox 13">
+            <a:extLst>
+              <a:ext uri="{FF2B5EF4-FFF2-40B4-BE49-F238E27FC236}">
+                <a16:creationId xmlns:a16="http://schemas.microsoft.com/office/drawing/2014/main" id="{69285301-2A01-4819-9DC5-157FC7AE2E3E}"/>
+              </a:ext>
+            </a:extLst>
+          </p:cNvPr>
+          <p:cNvSpPr txBox="1"/>
+          <p:nvPr/>
+        </p:nvSpPr>
+        <p:spPr>
+          <a:xfrm>
+            <a:off x="6019790" y="3932164"/>
+            <a:ext cx="1116414" cy="369332"/>
+          </a:xfrm>
+          <a:prstGeom prst="rect">
+            <a:avLst/>
+          </a:prstGeom>
+          <a:noFill/>
+        </p:spPr>
+        <p:txBody>
+          <a:bodyPr wrap="square" rtlCol="0">
+            <a:spAutoFit/>
+          </a:bodyPr>
+          <a:lstStyle/>
+          <a:p>
+            <a:r>
+              <a:rPr lang="en-US" dirty="0"/>
+              <a:t>-45</a:t>
+            </a:r>
+            <a:endParaRPr lang="en-GB" dirty="0"/>
+          </a:p>
+        </p:txBody>
+      </p:sp>
+      <p:sp>
+        <p:nvSpPr>
+          <p:cNvPr id="15" name="TextBox 14">
+            <a:extLst>
+              <a:ext uri="{FF2B5EF4-FFF2-40B4-BE49-F238E27FC236}">
+                <a16:creationId xmlns:a16="http://schemas.microsoft.com/office/drawing/2014/main" id="{FE514781-61F4-4F86-A283-FC402E055D99}"/>
+              </a:ext>
+            </a:extLst>
+          </p:cNvPr>
+          <p:cNvSpPr txBox="1"/>
+          <p:nvPr/>
+        </p:nvSpPr>
+        <p:spPr>
+          <a:xfrm>
+            <a:off x="3537095" y="1411922"/>
+            <a:ext cx="1116414" cy="369332"/>
+          </a:xfrm>
+          <a:prstGeom prst="rect">
+            <a:avLst/>
+          </a:prstGeom>
+          <a:noFill/>
+        </p:spPr>
+        <p:txBody>
+          <a:bodyPr wrap="square" rtlCol="0">
+            <a:spAutoFit/>
+          </a:bodyPr>
+          <a:lstStyle/>
+          <a:p>
+            <a:r>
+              <a:rPr lang="en-US" dirty="0"/>
+              <a:t>135</a:t>
+            </a:r>
+            <a:endParaRPr lang="en-GB" dirty="0"/>
+          </a:p>
+        </p:txBody>
+      </p:sp>
+      <p:sp>
+        <p:nvSpPr>
+          <p:cNvPr id="16" name="TextBox 15">
+            <a:extLst>
+              <a:ext uri="{FF2B5EF4-FFF2-40B4-BE49-F238E27FC236}">
+                <a16:creationId xmlns:a16="http://schemas.microsoft.com/office/drawing/2014/main" id="{0718FB67-5A8C-4CAE-B06B-4D1277A38507}"/>
+              </a:ext>
+            </a:extLst>
+          </p:cNvPr>
+          <p:cNvSpPr txBox="1"/>
+          <p:nvPr/>
+        </p:nvSpPr>
+        <p:spPr>
+          <a:xfrm>
+            <a:off x="3653169" y="4017228"/>
+            <a:ext cx="1116414" cy="369332"/>
+          </a:xfrm>
+          <a:prstGeom prst="rect">
+            <a:avLst/>
+          </a:prstGeom>
+          <a:noFill/>
+        </p:spPr>
+        <p:txBody>
+          <a:bodyPr wrap="square" rtlCol="0">
+            <a:spAutoFit/>
+          </a:bodyPr>
+          <a:lstStyle/>
+          <a:p>
+            <a:r>
+              <a:rPr lang="en-US" dirty="0"/>
+              <a:t>45</a:t>
+            </a:r>
+            <a:endParaRPr lang="en-GB" dirty="0"/>
+          </a:p>
+        </p:txBody>
+      </p:sp>
+      <p:sp>
+        <p:nvSpPr>
+          <p:cNvPr id="17" name="TextBox 16">
+            <a:extLst>
+              <a:ext uri="{FF2B5EF4-FFF2-40B4-BE49-F238E27FC236}">
+                <a16:creationId xmlns:a16="http://schemas.microsoft.com/office/drawing/2014/main" id="{AE1A10B5-906E-483D-8956-E2256B549EC2}"/>
+              </a:ext>
+            </a:extLst>
+          </p:cNvPr>
+          <p:cNvSpPr txBox="1"/>
+          <p:nvPr/>
+        </p:nvSpPr>
+        <p:spPr>
+          <a:xfrm>
+            <a:off x="6246623" y="1382233"/>
+            <a:ext cx="1116414" cy="369332"/>
+          </a:xfrm>
+          <a:prstGeom prst="rect">
+            <a:avLst/>
+          </a:prstGeom>
+          <a:noFill/>
+        </p:spPr>
+        <p:txBody>
+          <a:bodyPr wrap="square" rtlCol="0">
+            <a:spAutoFit/>
+          </a:bodyPr>
+          <a:lstStyle/>
+          <a:p>
+            <a:r>
+              <a:rPr lang="en-US" dirty="0"/>
+              <a:t>-135</a:t>
+            </a:r>
+            <a:endParaRPr lang="en-GB" dirty="0"/>
+          </a:p>
+        </p:txBody>
+      </p:sp>
+    </p:spTree>
+    <p:extLst>
+      <p:ext uri="{BB962C8B-B14F-4D97-AF65-F5344CB8AC3E}">
+        <p14:creationId xmlns:p14="http://schemas.microsoft.com/office/powerpoint/2010/main" val="305309606"/>
+      </p:ext>
+    </p:extLst>
+  </p:cSld>
+  <p:clrMapOvr>
+    <a:masterClrMapping/>
+  </p:clrMapOvr>
+</p:sld>
+</file>
+
 <file path=ppt/theme/theme1.xml><?xml version="1.0" encoding="utf-8"?>
 <a:theme xmlns:a="http://schemas.openxmlformats.org/drawingml/2006/main" name="Thème Office">
   <a:themeElements>

</xml_diff>